<commit_message>
No idea what I did here, but it must have been important.
</commit_message>
<xml_diff>
--- a/slides/Week1b.pptx
+++ b/slides/Week1b.pptx
@@ -369,6 +369,22 @@
       </a:defRPr>
     </a:lvl9pPr>
   </p:defaultTextStyle>
+  <p:extLst>
+    <p:ext uri="{EFAFB233-063F-42B5-8137-9DF3F51BA10A}">
+      <p15:sldGuideLst xmlns:p15="http://schemas.microsoft.com/office/powerpoint/2012/main">
+        <p15:guide id="1" orient="horz" pos="1656">
+          <p15:clr>
+            <a:srgbClr val="A4A3A4"/>
+          </p15:clr>
+        </p15:guide>
+        <p15:guide id="2" pos="2949">
+          <p15:clr>
+            <a:srgbClr val="A4A3A4"/>
+          </p15:clr>
+        </p15:guide>
+      </p15:sldGuideLst>
+    </p:ext>
+  </p:extLst>
 </p:presentation>
 </file>
 
@@ -533,6 +549,72 @@
 </p:notesMaster>
 </file>
 
+<file path=ppt/notesSlides/notesSlide1.xml><?xml version="1.0" encoding="utf-8"?>
+<p:notes xmlns:a="http://schemas.openxmlformats.org/drawingml/2006/main" xmlns:r="http://schemas.openxmlformats.org/officeDocument/2006/relationships" xmlns:p="http://schemas.openxmlformats.org/presentationml/2006/main">
+  <p:cSld>
+    <p:spTree>
+      <p:nvGrpSpPr>
+        <p:cNvPr id="1" name=""/>
+        <p:cNvGrpSpPr/>
+        <p:nvPr/>
+      </p:nvGrpSpPr>
+      <p:grpSpPr>
+        <a:xfrm>
+          <a:off x="0" y="0"/>
+          <a:ext cx="0" cy="0"/>
+          <a:chOff x="0" y="0"/>
+          <a:chExt cx="0" cy="0"/>
+        </a:xfrm>
+      </p:grpSpPr>
+      <p:sp>
+        <p:nvSpPr>
+          <p:cNvPr id="2" name="Slide Image Placeholder 1"/>
+          <p:cNvSpPr>
+            <a:spLocks noGrp="1" noRot="1" noChangeAspect="1"/>
+          </p:cNvSpPr>
+          <p:nvPr>
+            <p:ph type="sldImg"/>
+          </p:nvPr>
+        </p:nvSpPr>
+        <p:spPr>
+          <a:xfrm>
+            <a:off x="376238" y="685800"/>
+            <a:ext cx="6105525" cy="3429000"/>
+          </a:xfrm>
+        </p:spPr>
+      </p:sp>
+      <p:sp>
+        <p:nvSpPr>
+          <p:cNvPr id="3" name="Notes Placeholder 2"/>
+          <p:cNvSpPr>
+            <a:spLocks noGrp="1"/>
+          </p:cNvSpPr>
+          <p:nvPr>
+            <p:ph type="body" idx="1"/>
+          </p:nvPr>
+        </p:nvSpPr>
+        <p:spPr/>
+        <p:txBody>
+          <a:bodyPr/>
+          <a:lstStyle/>
+          <a:p>
+            <a:endParaRPr lang="en-US" dirty="0"/>
+          </a:p>
+        </p:txBody>
+      </p:sp>
+    </p:spTree>
+    <p:extLst>
+      <p:ext uri="{BB962C8B-B14F-4D97-AF65-F5344CB8AC3E}">
+        <p14:creationId xmlns:p14="http://schemas.microsoft.com/office/powerpoint/2010/main" val="2744986196"/>
+      </p:ext>
+    </p:extLst>
+  </p:cSld>
+  <p:clrMapOvr>
+    <a:masterClrMapping/>
+  </p:clrMapOvr>
+</p:notes>
+</file>
+
 <file path=ppt/slideLayouts/slideLayout1.xml><?xml version="1.0" encoding="utf-8"?>
 <p:sldLayout xmlns:a="http://schemas.openxmlformats.org/drawingml/2006/main" xmlns:r="http://schemas.openxmlformats.org/officeDocument/2006/relationships" xmlns:p="http://schemas.openxmlformats.org/presentationml/2006/main" type="tx">
   <p:cSld name="Title">
@@ -581,7 +663,7 @@
   <p:clrMapOvr>
     <a:masterClrMapping/>
   </p:clrMapOvr>
-  <p:transition xmlns:p14="http://schemas.microsoft.com/office/powerpoint/2010/main" spd="med"/>
+  <p:transition spd="med"/>
 </p:sldLayout>
 </file>
 
@@ -779,7 +861,7 @@
   <p:clrMapOvr>
     <a:masterClrMapping/>
   </p:clrMapOvr>
-  <p:transition xmlns:p14="http://schemas.microsoft.com/office/powerpoint/2010/main" spd="med"/>
+  <p:transition spd="med"/>
 </p:sldLayout>
 </file>
 
@@ -1039,7 +1121,7 @@
   <p:clrMapOvr>
     <a:masterClrMapping/>
   </p:clrMapOvr>
-  <p:transition xmlns:p14="http://schemas.microsoft.com/office/powerpoint/2010/main" spd="med"/>
+  <p:transition spd="med"/>
 </p:sldLayout>
 </file>
 
@@ -1103,7 +1185,7 @@
   <p:clrMapOvr>
     <a:masterClrMapping/>
   </p:clrMapOvr>
-  <p:transition xmlns:p14="http://schemas.microsoft.com/office/powerpoint/2010/main" spd="med"/>
+  <p:transition spd="med"/>
 </p:sldLayout>
 </file>
 
@@ -1184,7 +1266,7 @@
   <p:clrMapOvr>
     <a:masterClrMapping/>
   </p:clrMapOvr>
-  <p:transition xmlns:p14="http://schemas.microsoft.com/office/powerpoint/2010/main" spd="med"/>
+  <p:transition spd="med"/>
 </p:sldLayout>
 </file>
 
@@ -1253,7 +1335,7 @@
   <p:clrMapOvr>
     <a:masterClrMapping/>
   </p:clrMapOvr>
-  <p:transition xmlns:p14="http://schemas.microsoft.com/office/powerpoint/2010/main" spd="med"/>
+  <p:transition spd="med"/>
 </p:sldLayout>
 </file>
 
@@ -1654,7 +1736,7 @@
   <p:clrMapOvr>
     <a:masterClrMapping/>
   </p:clrMapOvr>
-  <p:transition xmlns:p14="http://schemas.microsoft.com/office/powerpoint/2010/main" spd="med"/>
+  <p:transition spd="med"/>
 </p:sldLayout>
 </file>
 
@@ -1883,7 +1965,7 @@
   <p:clrMapOvr>
     <a:masterClrMapping/>
   </p:clrMapOvr>
-  <p:transition xmlns:p14="http://schemas.microsoft.com/office/powerpoint/2010/main" spd="med"/>
+  <p:transition spd="med"/>
 </p:sldLayout>
 </file>
 
@@ -2112,7 +2194,7 @@
   <p:clrMapOvr>
     <a:masterClrMapping/>
   </p:clrMapOvr>
-  <p:transition xmlns:p14="http://schemas.microsoft.com/office/powerpoint/2010/main" spd="med"/>
+  <p:transition spd="med"/>
 </p:sldLayout>
 </file>
 
@@ -2342,7 +2424,7 @@
   <p:clrMapOvr>
     <a:masterClrMapping/>
   </p:clrMapOvr>
-  <p:transition xmlns:p14="http://schemas.microsoft.com/office/powerpoint/2010/main" spd="med"/>
+  <p:transition spd="med"/>
 </p:sldLayout>
 </file>
 
@@ -2606,7 +2688,7 @@
   <p:clrMapOvr>
     <a:masterClrMapping/>
   </p:clrMapOvr>
-  <p:transition xmlns:p14="http://schemas.microsoft.com/office/powerpoint/2010/main" spd="med"/>
+  <p:transition spd="med"/>
 </p:sldLayout>
 </file>
 
@@ -2726,7 +2808,7 @@
           </a:ln>
           <a:extLst>
             <a:ext uri="{C572A759-6A51-4108-AA02-DFA0A04FC94B}">
-              <ma14:wrappingTextBoxFlag xmlns:ma14="http://schemas.microsoft.com/office/mac/drawingml/2011/main" val="1"/>
+              <ma14:wrappingTextBoxFlag xmlns:ma14="http://schemas.microsoft.com/office/mac/drawingml/2011/main" xmlns="" val="1"/>
             </a:ext>
           </a:extLst>
         </p:spPr>
@@ -2763,7 +2845,7 @@
           </a:ln>
           <a:extLst>
             <a:ext uri="{C572A759-6A51-4108-AA02-DFA0A04FC94B}">
-              <ma14:wrappingTextBoxFlag xmlns:ma14="http://schemas.microsoft.com/office/mac/drawingml/2011/main" val="1"/>
+              <ma14:wrappingTextBoxFlag xmlns:ma14="http://schemas.microsoft.com/office/mac/drawingml/2011/main" xmlns="" val="1"/>
             </a:ext>
           </a:extLst>
         </p:spPr>
@@ -2881,7 +2963,7 @@
     <p:sldLayoutId id="2147483659" r:id="rId10"/>
     <p:sldLayoutId id="2147483660" r:id="rId11"/>
   </p:sldLayoutIdLst>
-  <p:transition xmlns:p14="http://schemas.microsoft.com/office/powerpoint/2010/main" spd="med"/>
+  <p:transition spd="med"/>
   <p:txStyles>
     <p:titleStyle>
       <a:lvl1pPr marL="0" marR="0" indent="0" algn="l" defTabSz="584200" latinLnBrk="0">
@@ -3982,22 +4064,18 @@
             </a:pPr>
             <a:r>
               <a:rPr dirty="0"/>
-              <a:t>Week </a:t>
-            </a:r>
-            <a:r>
-              <a:rPr dirty="0" smtClean="0"/>
-              <a:t>1</a:t>
-            </a:r>
-            <a:r>
-              <a:rPr lang="en-AU" dirty="0" smtClean="0"/>
+              <a:t>Week 1</a:t>
+            </a:r>
+            <a:r>
+              <a:rPr lang="en-AU" dirty="0"/>
               <a:t>b –</a:t>
             </a:r>
             <a:r>
-              <a:rPr dirty="0" smtClean="0"/>
+              <a:rPr dirty="0"/>
               <a:t> Git</a:t>
             </a:r>
             <a:r>
-              <a:rPr lang="en-AU" dirty="0" smtClean="0"/>
+              <a:rPr lang="en-AU" dirty="0"/>
               <a:t> Intro</a:t>
             </a:r>
             <a:endParaRPr dirty="0"/>
@@ -4009,7 +4087,7 @@
   <p:clrMapOvr>
     <a:masterClrMapping/>
   </p:clrMapOvr>
-  <p:transition xmlns:p14="http://schemas.microsoft.com/office/powerpoint/2010/main" spd="med"/>
+  <p:transition spd="med"/>
 </p:sld>
 </file>
 
@@ -4186,7 +4264,7 @@
           </a:prstGeom>
           <a:extLst>
             <a:ext uri="{C572A759-6A51-4108-AA02-DFA0A04FC94B}">
-              <ma14:wrappingTextBoxFlag xmlns:ma14="http://schemas.microsoft.com/office/mac/drawingml/2011/main" val="1"/>
+              <ma14:wrappingTextBoxFlag xmlns:ma14="http://schemas.microsoft.com/office/mac/drawingml/2011/main" xmlns="" val="1"/>
             </a:ext>
           </a:extLst>
         </p:spPr>
@@ -4301,7 +4379,7 @@
   <p:clrMapOvr>
     <a:masterClrMapping/>
   </p:clrMapOvr>
-  <p:transition xmlns:p14="http://schemas.microsoft.com/office/powerpoint/2010/main" spd="slow"/>
+  <p:transition spd="slow"/>
 </p:sld>
 </file>
 
@@ -4474,7 +4552,7 @@
           </a:prstGeom>
           <a:extLst>
             <a:ext uri="{C572A759-6A51-4108-AA02-DFA0A04FC94B}">
-              <ma14:wrappingTextBoxFlag xmlns:ma14="http://schemas.microsoft.com/office/mac/drawingml/2011/main" val="1"/>
+              <ma14:wrappingTextBoxFlag xmlns:ma14="http://schemas.microsoft.com/office/mac/drawingml/2011/main" xmlns="" val="1"/>
             </a:ext>
           </a:extLst>
         </p:spPr>
@@ -4602,7 +4680,7 @@
   <p:clrMapOvr>
     <a:masterClrMapping/>
   </p:clrMapOvr>
-  <p:transition xmlns:p14="http://schemas.microsoft.com/office/powerpoint/2010/main" spd="slow"/>
+  <p:transition spd="slow"/>
 </p:sld>
 </file>
 
@@ -4775,7 +4853,7 @@
           </a:prstGeom>
           <a:extLst>
             <a:ext uri="{C572A759-6A51-4108-AA02-DFA0A04FC94B}">
-              <ma14:wrappingTextBoxFlag xmlns:ma14="http://schemas.microsoft.com/office/mac/drawingml/2011/main" val="1"/>
+              <ma14:wrappingTextBoxFlag xmlns:ma14="http://schemas.microsoft.com/office/mac/drawingml/2011/main" xmlns="" val="1"/>
             </a:ext>
           </a:extLst>
         </p:spPr>
@@ -4939,7 +5017,7 @@
   <p:clrMapOvr>
     <a:masterClrMapping/>
   </p:clrMapOvr>
-  <p:transition xmlns:p14="http://schemas.microsoft.com/office/powerpoint/2010/main" spd="slow"/>
+  <p:transition spd="slow"/>
 </p:sld>
 </file>
 
@@ -5112,7 +5190,7 @@
           </a:prstGeom>
           <a:extLst>
             <a:ext uri="{C572A759-6A51-4108-AA02-DFA0A04FC94B}">
-              <ma14:wrappingTextBoxFlag xmlns:ma14="http://schemas.microsoft.com/office/mac/drawingml/2011/main" val="1"/>
+              <ma14:wrappingTextBoxFlag xmlns:ma14="http://schemas.microsoft.com/office/mac/drawingml/2011/main" xmlns="" val="1"/>
             </a:ext>
           </a:extLst>
         </p:spPr>
@@ -5287,7 +5365,7 @@
   <p:clrMapOvr>
     <a:masterClrMapping/>
   </p:clrMapOvr>
-  <p:transition xmlns:p14="http://schemas.microsoft.com/office/powerpoint/2010/main" spd="slow"/>
+  <p:transition spd="slow"/>
 </p:sld>
 </file>
 
@@ -5460,7 +5538,7 @@
           </a:prstGeom>
           <a:extLst>
             <a:ext uri="{C572A759-6A51-4108-AA02-DFA0A04FC94B}">
-              <ma14:wrappingTextBoxFlag xmlns:ma14="http://schemas.microsoft.com/office/mac/drawingml/2011/main" val="1"/>
+              <ma14:wrappingTextBoxFlag xmlns:ma14="http://schemas.microsoft.com/office/mac/drawingml/2011/main" xmlns="" val="1"/>
             </a:ext>
           </a:extLst>
         </p:spPr>
@@ -5713,7 +5791,7 @@
   <p:clrMapOvr>
     <a:masterClrMapping/>
   </p:clrMapOvr>
-  <p:transition xmlns:p14="http://schemas.microsoft.com/office/powerpoint/2010/main" spd="slow"/>
+  <p:transition spd="slow"/>
 </p:sld>
 </file>
 
@@ -5886,7 +5964,7 @@
           </a:prstGeom>
           <a:extLst>
             <a:ext uri="{C572A759-6A51-4108-AA02-DFA0A04FC94B}">
-              <ma14:wrappingTextBoxFlag xmlns:ma14="http://schemas.microsoft.com/office/mac/drawingml/2011/main" val="1"/>
+              <ma14:wrappingTextBoxFlag xmlns:ma14="http://schemas.microsoft.com/office/mac/drawingml/2011/main" xmlns="" val="1"/>
             </a:ext>
           </a:extLst>
         </p:spPr>
@@ -6080,7 +6158,7 @@
   <p:clrMapOvr>
     <a:masterClrMapping/>
   </p:clrMapOvr>
-  <p:transition xmlns:p14="http://schemas.microsoft.com/office/powerpoint/2010/main" spd="slow"/>
+  <p:transition spd="slow"/>
 </p:sld>
 </file>
 
@@ -6253,7 +6331,7 @@
           </a:prstGeom>
           <a:extLst>
             <a:ext uri="{C572A759-6A51-4108-AA02-DFA0A04FC94B}">
-              <ma14:wrappingTextBoxFlag xmlns:ma14="http://schemas.microsoft.com/office/mac/drawingml/2011/main" val="1"/>
+              <ma14:wrappingTextBoxFlag xmlns:ma14="http://schemas.microsoft.com/office/mac/drawingml/2011/main" xmlns="" val="1"/>
             </a:ext>
           </a:extLst>
         </p:spPr>
@@ -6407,7 +6485,7 @@
   <p:clrMapOvr>
     <a:masterClrMapping/>
   </p:clrMapOvr>
-  <p:transition xmlns:p14="http://schemas.microsoft.com/office/powerpoint/2010/main" spd="slow"/>
+  <p:transition spd="slow"/>
 </p:sld>
 </file>
 
@@ -6580,7 +6658,7 @@
           </a:prstGeom>
           <a:extLst>
             <a:ext uri="{C572A759-6A51-4108-AA02-DFA0A04FC94B}">
-              <ma14:wrappingTextBoxFlag xmlns:ma14="http://schemas.microsoft.com/office/mac/drawingml/2011/main" val="1"/>
+              <ma14:wrappingTextBoxFlag xmlns:ma14="http://schemas.microsoft.com/office/mac/drawingml/2011/main" xmlns="" val="1"/>
             </a:ext>
           </a:extLst>
         </p:spPr>
@@ -6704,7 +6782,7 @@
   <p:clrMapOvr>
     <a:masterClrMapping/>
   </p:clrMapOvr>
-  <p:transition xmlns:p14="http://schemas.microsoft.com/office/powerpoint/2010/main" spd="slow"/>
+  <p:transition spd="slow"/>
 </p:sld>
 </file>
 
@@ -6877,7 +6955,7 @@
           </a:prstGeom>
           <a:extLst>
             <a:ext uri="{C572A759-6A51-4108-AA02-DFA0A04FC94B}">
-              <ma14:wrappingTextBoxFlag xmlns:ma14="http://schemas.microsoft.com/office/mac/drawingml/2011/main" val="1"/>
+              <ma14:wrappingTextBoxFlag xmlns:ma14="http://schemas.microsoft.com/office/mac/drawingml/2011/main" xmlns="" val="1"/>
             </a:ext>
           </a:extLst>
         </p:spPr>
@@ -7079,7 +7157,7 @@
   <p:clrMapOvr>
     <a:masterClrMapping/>
   </p:clrMapOvr>
-  <p:transition xmlns:p14="http://schemas.microsoft.com/office/powerpoint/2010/main" spd="slow"/>
+  <p:transition spd="slow"/>
 </p:sld>
 </file>
 
@@ -7252,7 +7330,7 @@
           </a:prstGeom>
           <a:extLst>
             <a:ext uri="{C572A759-6A51-4108-AA02-DFA0A04FC94B}">
-              <ma14:wrappingTextBoxFlag xmlns:ma14="http://schemas.microsoft.com/office/mac/drawingml/2011/main" val="1"/>
+              <ma14:wrappingTextBoxFlag xmlns:ma14="http://schemas.microsoft.com/office/mac/drawingml/2011/main" xmlns="" val="1"/>
             </a:ext>
           </a:extLst>
         </p:spPr>
@@ -7435,7 +7513,7 @@
   <p:clrMapOvr>
     <a:masterClrMapping/>
   </p:clrMapOvr>
-  <p:transition xmlns:p14="http://schemas.microsoft.com/office/powerpoint/2010/main" spd="slow"/>
+  <p:transition spd="slow"/>
 </p:sld>
 </file>
 
@@ -7612,7 +7690,7 @@
           </a:prstGeom>
           <a:extLst>
             <a:ext uri="{C572A759-6A51-4108-AA02-DFA0A04FC94B}">
-              <ma14:wrappingTextBoxFlag xmlns:ma14="http://schemas.microsoft.com/office/mac/drawingml/2011/main" val="1"/>
+              <ma14:wrappingTextBoxFlag xmlns:ma14="http://schemas.microsoft.com/office/mac/drawingml/2011/main" xmlns="" val="1"/>
             </a:ext>
           </a:extLst>
         </p:spPr>
@@ -7734,7 +7812,7 @@
   <p:clrMapOvr>
     <a:masterClrMapping/>
   </p:clrMapOvr>
-  <p:transition xmlns:p14="http://schemas.microsoft.com/office/powerpoint/2010/main" spd="slow"/>
+  <p:transition spd="slow"/>
 </p:sld>
 </file>
 
@@ -7907,7 +7985,7 @@
           </a:prstGeom>
           <a:extLst>
             <a:ext uri="{C572A759-6A51-4108-AA02-DFA0A04FC94B}">
-              <ma14:wrappingTextBoxFlag xmlns:ma14="http://schemas.microsoft.com/office/mac/drawingml/2011/main" val="1"/>
+              <ma14:wrappingTextBoxFlag xmlns:ma14="http://schemas.microsoft.com/office/mac/drawingml/2011/main" xmlns="" val="1"/>
             </a:ext>
           </a:extLst>
         </p:spPr>
@@ -8162,7 +8240,7 @@
   <p:clrMapOvr>
     <a:masterClrMapping/>
   </p:clrMapOvr>
-  <p:transition xmlns:p14="http://schemas.microsoft.com/office/powerpoint/2010/main" spd="slow"/>
+  <p:transition spd="slow"/>
 </p:sld>
 </file>
 
@@ -8240,7 +8318,7 @@
               <a:tabLst/>
             </a:pPr>
             <a:r>
-              <a:rPr kumimoji="0" lang="en-US" sz="2300" b="1" i="0" u="none" strike="noStrike" cap="none" spc="0" normalizeH="0" baseline="0" dirty="0" err="1" smtClean="0">
+              <a:rPr kumimoji="0" lang="en-US" sz="2300" b="1" i="0" u="none" strike="noStrike" cap="none" spc="0" normalizeH="0" baseline="0" dirty="0" err="1">
                 <a:ln>
                   <a:noFill/>
                 </a:ln>
@@ -8261,7 +8339,7 @@
               <a:t>Git</a:t>
             </a:r>
             <a:r>
-              <a:rPr kumimoji="0" lang="en-US" sz="2300" b="1" i="0" u="none" strike="noStrike" cap="none" spc="0" normalizeH="0" dirty="0" smtClean="0">
+              <a:rPr kumimoji="0" lang="en-US" sz="2300" b="1" i="0" u="none" strike="noStrike" cap="none" spc="0" normalizeH="0" dirty="0">
                 <a:ln>
                   <a:noFill/>
                 </a:ln>
@@ -8359,7 +8437,7 @@
               <a:tabLst/>
             </a:pPr>
             <a:r>
-              <a:rPr kumimoji="0" lang="en-US" sz="1800" b="1" i="0" u="none" strike="noStrike" cap="none" spc="0" normalizeH="0" baseline="0" dirty="0" smtClean="0">
+              <a:rPr kumimoji="0" lang="en-US" sz="1800" b="1" i="0" u="none" strike="noStrike" cap="none" spc="0" normalizeH="0" baseline="0" dirty="0">
                 <a:ln>
                   <a:noFill/>
                 </a:ln>
@@ -8377,7 +8455,7 @@
               <a:t>Make a repo</a:t>
             </a:r>
             <a:r>
-              <a:rPr kumimoji="0" lang="en-US" sz="1800" b="1" i="0" u="none" strike="noStrike" cap="none" spc="0" normalizeH="0" dirty="0" smtClean="0">
+              <a:rPr kumimoji="0" lang="en-US" sz="1800" b="1" i="0" u="none" strike="noStrike" cap="none" spc="0" normalizeH="0" dirty="0">
                 <a:ln>
                   <a:noFill/>
                 </a:ln>
@@ -8413,7 +8491,7 @@
               <a:tabLst/>
             </a:pPr>
             <a:r>
-              <a:rPr kumimoji="0" lang="en-US" sz="1800" b="1" i="0" u="none" strike="noStrike" cap="none" spc="0" normalizeH="0" baseline="0" dirty="0" smtClean="0">
+              <a:rPr kumimoji="0" lang="en-US" sz="1800" b="1" i="0" u="none" strike="noStrike" cap="none" spc="0" normalizeH="0" baseline="0" dirty="0">
                 <a:ln>
                   <a:noFill/>
                 </a:ln>
@@ -8449,7 +8527,7 @@
               <a:tabLst/>
             </a:pPr>
             <a:r>
-              <a:rPr lang="en-US" sz="1800" dirty="0" smtClean="0"/>
+              <a:rPr lang="en-US" sz="1800" dirty="0"/>
               <a:t>Edit something / create some new files</a:t>
             </a:r>
           </a:p>
@@ -8471,31 +8549,31 @@
               <a:tabLst/>
             </a:pPr>
             <a:r>
-              <a:rPr lang="en-US" sz="1800" dirty="0" smtClean="0"/>
+              <a:rPr lang="en-US" sz="1800" dirty="0"/>
               <a:t>Use </a:t>
             </a:r>
             <a:r>
-              <a:rPr lang="en-US" sz="1800" dirty="0" err="1" smtClean="0"/>
+              <a:rPr lang="en-US" sz="1800" dirty="0" err="1"/>
               <a:t>git</a:t>
             </a:r>
             <a:r>
-              <a:rPr lang="en-US" sz="1800" dirty="0" smtClean="0"/>
+              <a:rPr lang="en-US" sz="1800" dirty="0"/>
               <a:t> add, </a:t>
             </a:r>
             <a:r>
-              <a:rPr lang="en-US" sz="1800" dirty="0" err="1" smtClean="0"/>
+              <a:rPr lang="en-US" sz="1800" dirty="0" err="1"/>
               <a:t>git</a:t>
             </a:r>
             <a:r>
-              <a:rPr lang="en-US" sz="1800" dirty="0" smtClean="0"/>
+              <a:rPr lang="en-US" sz="1800" dirty="0"/>
               <a:t> commit and </a:t>
             </a:r>
             <a:r>
-              <a:rPr lang="en-US" sz="1800" dirty="0" err="1" smtClean="0"/>
+              <a:rPr lang="en-US" sz="1800" dirty="0" err="1"/>
               <a:t>git</a:t>
             </a:r>
             <a:r>
-              <a:rPr lang="en-US" sz="1800" dirty="0" smtClean="0"/>
+              <a:rPr lang="en-US" sz="1800" dirty="0"/>
               <a:t> push</a:t>
             </a:r>
           </a:p>
@@ -8517,11 +8595,11 @@
               <a:tabLst/>
             </a:pPr>
             <a:r>
-              <a:rPr lang="en-US" sz="1800" dirty="0" smtClean="0"/>
+              <a:rPr lang="en-US" sz="1800" dirty="0"/>
               <a:t>Confirm that the changed file is on </a:t>
             </a:r>
             <a:r>
-              <a:rPr lang="en-US" sz="1800" dirty="0" err="1" smtClean="0"/>
+              <a:rPr lang="en-US" sz="1800" dirty="0" err="1"/>
               <a:t>github</a:t>
             </a:r>
             <a:endParaRPr kumimoji="0" lang="en-US" sz="1800" b="1" i="0" u="none" strike="noStrike" cap="none" spc="0" normalizeH="0" baseline="0" dirty="0">
@@ -8552,7 +8630,7 @@
   <p:clrMapOvr>
     <a:masterClrMapping/>
   </p:clrMapOvr>
-  <p:transition xmlns:p14="http://schemas.microsoft.com/office/powerpoint/2010/main" spd="med"/>
+  <p:transition spd="med"/>
 </p:sld>
 </file>
 
@@ -8605,7 +8683,7 @@
   <p:clrMapOvr>
     <a:masterClrMapping/>
   </p:clrMapOvr>
-  <p:transition xmlns:p14="http://schemas.microsoft.com/office/powerpoint/2010/main" spd="slow"/>
+  <p:transition spd="slow"/>
 </p:sld>
 </file>
 
@@ -8658,7 +8736,7 @@
   <p:clrMapOvr>
     <a:masterClrMapping/>
   </p:clrMapOvr>
-  <p:transition xmlns:p14="http://schemas.microsoft.com/office/powerpoint/2010/main" spd="slow"/>
+  <p:transition spd="slow"/>
 </p:sld>
 </file>
 
@@ -8711,7 +8789,7 @@
   <p:clrMapOvr>
     <a:masterClrMapping/>
   </p:clrMapOvr>
-  <p:transition xmlns:p14="http://schemas.microsoft.com/office/powerpoint/2010/main" spd="slow"/>
+  <p:transition spd="slow"/>
 </p:sld>
 </file>
 
@@ -8888,7 +8966,7 @@
           </a:prstGeom>
           <a:extLst>
             <a:ext uri="{C572A759-6A51-4108-AA02-DFA0A04FC94B}">
-              <ma14:wrappingTextBoxFlag xmlns:ma14="http://schemas.microsoft.com/office/mac/drawingml/2011/main" val="1"/>
+              <ma14:wrappingTextBoxFlag xmlns:ma14="http://schemas.microsoft.com/office/mac/drawingml/2011/main" xmlns="" val="1"/>
             </a:ext>
           </a:extLst>
         </p:spPr>
@@ -9027,7 +9105,7 @@
   <p:clrMapOvr>
     <a:masterClrMapping/>
   </p:clrMapOvr>
-  <p:transition xmlns:p14="http://schemas.microsoft.com/office/powerpoint/2010/main" spd="slow"/>
+  <p:transition spd="slow"/>
 </p:sld>
 </file>
 
@@ -9204,7 +9282,7 @@
           </a:prstGeom>
           <a:extLst>
             <a:ext uri="{C572A759-6A51-4108-AA02-DFA0A04FC94B}">
-              <ma14:wrappingTextBoxFlag xmlns:ma14="http://schemas.microsoft.com/office/mac/drawingml/2011/main" val="1"/>
+              <ma14:wrappingTextBoxFlag xmlns:ma14="http://schemas.microsoft.com/office/mac/drawingml/2011/main" xmlns="" val="1"/>
             </a:ext>
           </a:extLst>
         </p:spPr>
@@ -9362,7 +9440,7 @@
   <p:clrMapOvr>
     <a:masterClrMapping/>
   </p:clrMapOvr>
-  <p:transition xmlns:p14="http://schemas.microsoft.com/office/powerpoint/2010/main" spd="slow"/>
+  <p:transition spd="slow"/>
 </p:sld>
 </file>
 
@@ -9539,7 +9617,7 @@
           </a:prstGeom>
           <a:extLst>
             <a:ext uri="{C572A759-6A51-4108-AA02-DFA0A04FC94B}">
-              <ma14:wrappingTextBoxFlag xmlns:ma14="http://schemas.microsoft.com/office/mac/drawingml/2011/main" val="1"/>
+              <ma14:wrappingTextBoxFlag xmlns:ma14="http://schemas.microsoft.com/office/mac/drawingml/2011/main" xmlns="" val="1"/>
             </a:ext>
           </a:extLst>
         </p:spPr>
@@ -9597,7 +9675,7 @@
         </p:nvGraphicFramePr>
         <p:xfrm>
           <a:off x="457200" y="1112661"/>
-          <a:ext cx="8448675" cy="3810000"/>
+          <a:ext cx="8448675" cy="3580272"/>
         </p:xfrm>
         <a:graphic>
           <a:graphicData uri="http://schemas.openxmlformats.org/drawingml/2006/table">
@@ -9609,21 +9687,21 @@
                 <a:gridCol w="2173111">
                   <a:extLst>
                     <a:ext uri="{9D8B030D-6E8A-4147-A177-3AD203B41FA5}">
-                      <a16:colId xmlns:a16="http://schemas.microsoft.com/office/drawing/2014/main" xmlns="" val="600125839"/>
+                      <a16:colId xmlns:a16="http://schemas.microsoft.com/office/drawing/2014/main" val="600125839"/>
                     </a:ext>
                   </a:extLst>
                 </a:gridCol>
                 <a:gridCol w="4109156">
                   <a:extLst>
                     <a:ext uri="{9D8B030D-6E8A-4147-A177-3AD203B41FA5}">
-                      <a16:colId xmlns:a16="http://schemas.microsoft.com/office/drawing/2014/main" xmlns="" val="2468877232"/>
+                      <a16:colId xmlns:a16="http://schemas.microsoft.com/office/drawing/2014/main" val="2468877232"/>
                     </a:ext>
                   </a:extLst>
                 </a:gridCol>
                 <a:gridCol w="2166408">
                   <a:extLst>
                     <a:ext uri="{9D8B030D-6E8A-4147-A177-3AD203B41FA5}">
-                      <a16:colId xmlns:a16="http://schemas.microsoft.com/office/drawing/2014/main" xmlns="" val="3642540341"/>
+                      <a16:colId xmlns:a16="http://schemas.microsoft.com/office/drawing/2014/main" val="3642540341"/>
                     </a:ext>
                   </a:extLst>
                 </a:gridCol>
@@ -9678,7 +9756,7 @@
                 </a:tc>
                 <a:extLst>
                   <a:ext uri="{0D108BD9-81ED-4DB2-BD59-A6C34878D82A}">
-                    <a16:rowId xmlns:a16="http://schemas.microsoft.com/office/drawing/2014/main" xmlns="" val="4289102780"/>
+                    <a16:rowId xmlns:a16="http://schemas.microsoft.com/office/drawing/2014/main" val="4289102780"/>
                   </a:ext>
                 </a:extLst>
               </a:tr>
@@ -9728,7 +9806,7 @@
                 </a:tc>
                 <a:extLst>
                   <a:ext uri="{0D108BD9-81ED-4DB2-BD59-A6C34878D82A}">
-                    <a16:rowId xmlns:a16="http://schemas.microsoft.com/office/drawing/2014/main" xmlns="" val="3233415237"/>
+                    <a16:rowId xmlns:a16="http://schemas.microsoft.com/office/drawing/2014/main" val="3233415237"/>
                   </a:ext>
                 </a:extLst>
               </a:tr>
@@ -9786,7 +9864,7 @@
                 </a:tc>
                 <a:extLst>
                   <a:ext uri="{0D108BD9-81ED-4DB2-BD59-A6C34878D82A}">
-                    <a16:rowId xmlns:a16="http://schemas.microsoft.com/office/drawing/2014/main" xmlns="" val="375668650"/>
+                    <a16:rowId xmlns:a16="http://schemas.microsoft.com/office/drawing/2014/main" val="375668650"/>
                   </a:ext>
                 </a:extLst>
               </a:tr>
@@ -9854,7 +9932,7 @@
                 </a:tc>
                 <a:extLst>
                   <a:ext uri="{0D108BD9-81ED-4DB2-BD59-A6C34878D82A}">
-                    <a16:rowId xmlns:a16="http://schemas.microsoft.com/office/drawing/2014/main" xmlns="" val="1123399970"/>
+                    <a16:rowId xmlns:a16="http://schemas.microsoft.com/office/drawing/2014/main" val="1123399970"/>
                   </a:ext>
                 </a:extLst>
               </a:tr>
@@ -9922,7 +10000,7 @@
                 </a:tc>
                 <a:extLst>
                   <a:ext uri="{0D108BD9-81ED-4DB2-BD59-A6C34878D82A}">
-                    <a16:rowId xmlns:a16="http://schemas.microsoft.com/office/drawing/2014/main" xmlns="" val="2253595096"/>
+                    <a16:rowId xmlns:a16="http://schemas.microsoft.com/office/drawing/2014/main" val="2253595096"/>
                   </a:ext>
                 </a:extLst>
               </a:tr>
@@ -9940,7 +10018,7 @@
   <p:clrMapOvr>
     <a:masterClrMapping/>
   </p:clrMapOvr>
-  <p:transition xmlns:p14="http://schemas.microsoft.com/office/powerpoint/2010/main" spd="slow"/>
+  <p:transition spd="slow"/>
 </p:sld>
 </file>
 
@@ -10117,7 +10195,7 @@
           </a:prstGeom>
           <a:extLst>
             <a:ext uri="{C572A759-6A51-4108-AA02-DFA0A04FC94B}">
-              <ma14:wrappingTextBoxFlag xmlns:ma14="http://schemas.microsoft.com/office/mac/drawingml/2011/main" val="1"/>
+              <ma14:wrappingTextBoxFlag xmlns:ma14="http://schemas.microsoft.com/office/mac/drawingml/2011/main" xmlns="" val="1"/>
             </a:ext>
           </a:extLst>
         </p:spPr>
@@ -10318,7 +10396,7 @@
   <p:clrMapOvr>
     <a:masterClrMapping/>
   </p:clrMapOvr>
-  <p:transition xmlns:p14="http://schemas.microsoft.com/office/powerpoint/2010/main" spd="slow"/>
+  <p:transition spd="slow"/>
 </p:sld>
 </file>
 
@@ -10495,7 +10573,7 @@
           </a:prstGeom>
           <a:extLst>
             <a:ext uri="{C572A759-6A51-4108-AA02-DFA0A04FC94B}">
-              <ma14:wrappingTextBoxFlag xmlns:ma14="http://schemas.microsoft.com/office/mac/drawingml/2011/main" val="1"/>
+              <ma14:wrappingTextBoxFlag xmlns:ma14="http://schemas.microsoft.com/office/mac/drawingml/2011/main" xmlns="" val="1"/>
             </a:ext>
           </a:extLst>
         </p:spPr>
@@ -10600,7 +10678,7 @@
   <p:clrMapOvr>
     <a:masterClrMapping/>
   </p:clrMapOvr>
-  <p:transition xmlns:p14="http://schemas.microsoft.com/office/powerpoint/2010/main" spd="slow"/>
+  <p:transition spd="slow"/>
 </p:sld>
 </file>
 
@@ -10777,7 +10855,7 @@
           </a:prstGeom>
           <a:extLst>
             <a:ext uri="{C572A759-6A51-4108-AA02-DFA0A04FC94B}">
-              <ma14:wrappingTextBoxFlag xmlns:ma14="http://schemas.microsoft.com/office/mac/drawingml/2011/main" val="1"/>
+              <ma14:wrappingTextBoxFlag xmlns:ma14="http://schemas.microsoft.com/office/mac/drawingml/2011/main" xmlns="" val="1"/>
             </a:ext>
           </a:extLst>
         </p:spPr>
@@ -10893,7 +10971,7 @@
   <p:clrMapOvr>
     <a:masterClrMapping/>
   </p:clrMapOvr>
-  <p:transition xmlns:p14="http://schemas.microsoft.com/office/powerpoint/2010/main" spd="slow"/>
+  <p:transition spd="slow"/>
 </p:sld>
 </file>
 
@@ -11070,7 +11148,7 @@
           </a:prstGeom>
           <a:extLst>
             <a:ext uri="{C572A759-6A51-4108-AA02-DFA0A04FC94B}">
-              <ma14:wrappingTextBoxFlag xmlns:ma14="http://schemas.microsoft.com/office/mac/drawingml/2011/main" val="1"/>
+              <ma14:wrappingTextBoxFlag xmlns:ma14="http://schemas.microsoft.com/office/mac/drawingml/2011/main" xmlns="" val="1"/>
             </a:ext>
           </a:extLst>
         </p:spPr>
@@ -11235,7 +11313,7 @@
   <p:clrMapOvr>
     <a:masterClrMapping/>
   </p:clrMapOvr>
-  <p:transition xmlns:p14="http://schemas.microsoft.com/office/powerpoint/2010/main" spd="slow"/>
+  <p:transition spd="slow"/>
 </p:sld>
 </file>
 

</xml_diff>